<commit_message>
change fixation to dot
</commit_message>
<xml_diff>
--- a/instructions/Instructions.pptx
+++ b/instructions/Instructions.pptx
@@ -169,7 +169,7 @@
   <pc:docChgLst>
     <pc:chgData name="Micha Engeser" userId="a533b431-da3e-471f-8983-fd723c6850d4" providerId="ADAL" clId="{05E83482-96C4-4B03-864C-FE5F129C6CDA}"/>
     <pc:docChg chg="undo custSel addSld delSld modSld sldOrd addSection modSection">
-      <pc:chgData name="Micha Engeser" userId="a533b431-da3e-471f-8983-fd723c6850d4" providerId="ADAL" clId="{05E83482-96C4-4B03-864C-FE5F129C6CDA}" dt="2023-11-28T10:21:04.188" v="3285" actId="20577"/>
+      <pc:chgData name="Micha Engeser" userId="a533b431-da3e-471f-8983-fd723c6850d4" providerId="ADAL" clId="{05E83482-96C4-4B03-864C-FE5F129C6CDA}" dt="2023-12-01T12:58:01.639" v="3375" actId="22"/>
       <pc:docMkLst>
         <pc:docMk/>
       </pc:docMkLst>
@@ -402,7 +402,7 @@
         </pc:spChg>
       </pc:sldChg>
       <pc:sldChg chg="addSp delSp modSp add mod">
-        <pc:chgData name="Micha Engeser" userId="a533b431-da3e-471f-8983-fd723c6850d4" providerId="ADAL" clId="{05E83482-96C4-4B03-864C-FE5F129C6CDA}" dt="2023-11-27T15:54:26.116" v="3147" actId="20577"/>
+        <pc:chgData name="Micha Engeser" userId="a533b431-da3e-471f-8983-fd723c6850d4" providerId="ADAL" clId="{05E83482-96C4-4B03-864C-FE5F129C6CDA}" dt="2023-12-01T12:54:48.741" v="3370" actId="22"/>
         <pc:sldMkLst>
           <pc:docMk/>
           <pc:sldMk cId="2338977154" sldId="270"/>
@@ -423,6 +423,14 @@
             <ac:spMk id="3" creationId="{5533AE1F-64CC-6EDB-78FA-A320472CFC15}"/>
           </ac:spMkLst>
         </pc:spChg>
+        <pc:spChg chg="add del">
+          <ac:chgData name="Micha Engeser" userId="a533b431-da3e-471f-8983-fd723c6850d4" providerId="ADAL" clId="{05E83482-96C4-4B03-864C-FE5F129C6CDA}" dt="2023-12-01T12:40:43.669" v="3369" actId="478"/>
+          <ac:spMkLst>
+            <pc:docMk/>
+            <pc:sldMk cId="2338977154" sldId="270"/>
+            <ac:spMk id="3" creationId="{C6A81CC4-0FD0-95C7-3308-F2AA65D92B23}"/>
+          </ac:spMkLst>
+        </pc:spChg>
         <pc:spChg chg="mod">
           <ac:chgData name="Micha Engeser" userId="a533b431-da3e-471f-8983-fd723c6850d4" providerId="ADAL" clId="{05E83482-96C4-4B03-864C-FE5F129C6CDA}" dt="2023-11-27T15:54:26.116" v="3147" actId="20577"/>
           <ac:spMkLst>
@@ -477,6 +485,14 @@
             <pc:docMk/>
             <pc:sldMk cId="2338977154" sldId="270"/>
             <ac:picMk id="3" creationId="{203BE947-F453-4732-6E5E-DE77E119B2E2}"/>
+          </ac:picMkLst>
+        </pc:picChg>
+        <pc:picChg chg="add">
+          <ac:chgData name="Micha Engeser" userId="a533b431-da3e-471f-8983-fd723c6850d4" providerId="ADAL" clId="{05E83482-96C4-4B03-864C-FE5F129C6CDA}" dt="2023-12-01T12:54:48.741" v="3370" actId="22"/>
+          <ac:picMkLst>
+            <pc:docMk/>
+            <pc:sldMk cId="2338977154" sldId="270"/>
+            <ac:picMk id="8" creationId="{F9D93483-E00C-4B3D-0016-4FAE33DDA13F}"/>
           </ac:picMkLst>
         </pc:picChg>
         <pc:picChg chg="del mod">
@@ -876,7 +892,7 @@
         </pc:spChg>
       </pc:sldChg>
       <pc:sldChg chg="addSp delSp modSp add mod">
-        <pc:chgData name="Micha Engeser" userId="a533b431-da3e-471f-8983-fd723c6850d4" providerId="ADAL" clId="{05E83482-96C4-4B03-864C-FE5F129C6CDA}" dt="2023-11-27T15:54:11.980" v="3135" actId="20577"/>
+        <pc:chgData name="Micha Engeser" userId="a533b431-da3e-471f-8983-fd723c6850d4" providerId="ADAL" clId="{05E83482-96C4-4B03-864C-FE5F129C6CDA}" dt="2023-12-01T12:56:42.404" v="3372" actId="1076"/>
         <pc:sldMkLst>
           <pc:docMk/>
           <pc:sldMk cId="196451270" sldId="282"/>
@@ -953,15 +969,23 @@
             <ac:spMk id="10" creationId="{C5729EE5-5FA4-70EA-75D0-5F1045B283EB}"/>
           </ac:spMkLst>
         </pc:spChg>
+        <pc:picChg chg="add mod">
+          <ac:chgData name="Micha Engeser" userId="a533b431-da3e-471f-8983-fd723c6850d4" providerId="ADAL" clId="{05E83482-96C4-4B03-864C-FE5F129C6CDA}" dt="2023-12-01T12:56:42.404" v="3372" actId="1076"/>
+          <ac:picMkLst>
+            <pc:docMk/>
+            <pc:sldMk cId="196451270" sldId="282"/>
+            <ac:picMk id="3" creationId="{511E7084-13DD-261A-40E7-8908B1FD66A5}"/>
+          </ac:picMkLst>
+        </pc:picChg>
       </pc:sldChg>
-      <pc:sldChg chg="modSp add mod">
-        <pc:chgData name="Micha Engeser" userId="a533b431-da3e-471f-8983-fd723c6850d4" providerId="ADAL" clId="{05E83482-96C4-4B03-864C-FE5F129C6CDA}" dt="2023-11-27T15:54:39.407" v="3157" actId="20577"/>
+      <pc:sldChg chg="addSp modSp add mod">
+        <pc:chgData name="Micha Engeser" userId="a533b431-da3e-471f-8983-fd723c6850d4" providerId="ADAL" clId="{05E83482-96C4-4B03-864C-FE5F129C6CDA}" dt="2023-12-01T12:57:32.434" v="3374" actId="1076"/>
         <pc:sldMkLst>
           <pc:docMk/>
           <pc:sldMk cId="1400370751" sldId="283"/>
         </pc:sldMkLst>
         <pc:spChg chg="mod">
-          <ac:chgData name="Micha Engeser" userId="a533b431-da3e-471f-8983-fd723c6850d4" providerId="ADAL" clId="{05E83482-96C4-4B03-864C-FE5F129C6CDA}" dt="2023-11-27T15:54:39.407" v="3157" actId="20577"/>
+          <ac:chgData name="Micha Engeser" userId="a533b431-da3e-471f-8983-fd723c6850d4" providerId="ADAL" clId="{05E83482-96C4-4B03-864C-FE5F129C6CDA}" dt="2023-12-01T10:40:35.801" v="3292" actId="20577"/>
           <ac:spMkLst>
             <pc:docMk/>
             <pc:sldMk cId="1400370751" sldId="283"/>
@@ -984,6 +1008,14 @@
             <ac:spMk id="7" creationId="{0AA3FE03-F79A-542E-C548-871038B6ADAD}"/>
           </ac:spMkLst>
         </pc:spChg>
+        <pc:picChg chg="add mod">
+          <ac:chgData name="Micha Engeser" userId="a533b431-da3e-471f-8983-fd723c6850d4" providerId="ADAL" clId="{05E83482-96C4-4B03-864C-FE5F129C6CDA}" dt="2023-12-01T12:57:32.434" v="3374" actId="1076"/>
+          <ac:picMkLst>
+            <pc:docMk/>
+            <pc:sldMk cId="1400370751" sldId="283"/>
+            <ac:picMk id="3" creationId="{58AC10CD-296A-6EE6-69A2-16B8EB978E39}"/>
+          </ac:picMkLst>
+        </pc:picChg>
       </pc:sldChg>
       <pc:sldChg chg="delSp modSp add del mod ord">
         <pc:chgData name="Micha Engeser" userId="a533b431-da3e-471f-8983-fd723c6850d4" providerId="ADAL" clId="{05E83482-96C4-4B03-864C-FE5F129C6CDA}" dt="2023-11-24T15:39:17.740" v="2796" actId="47"/>
@@ -1009,7 +1041,7 @@
         </pc:spChg>
       </pc:sldChg>
       <pc:sldChg chg="addSp delSp modSp add mod">
-        <pc:chgData name="Micha Engeser" userId="a533b431-da3e-471f-8983-fd723c6850d4" providerId="ADAL" clId="{05E83482-96C4-4B03-864C-FE5F129C6CDA}" dt="2023-11-27T15:55:40.236" v="3180" actId="20577"/>
+        <pc:chgData name="Micha Engeser" userId="a533b431-da3e-471f-8983-fd723c6850d4" providerId="ADAL" clId="{05E83482-96C4-4B03-864C-FE5F129C6CDA}" dt="2023-12-01T12:58:01.639" v="3375" actId="22"/>
         <pc:sldMkLst>
           <pc:docMk/>
           <pc:sldMk cId="2961459844" sldId="285"/>
@@ -1054,6 +1086,14 @@
             <ac:spMk id="7" creationId="{0AA3FE03-F79A-542E-C548-871038B6ADAD}"/>
           </ac:spMkLst>
         </pc:spChg>
+        <pc:picChg chg="add">
+          <ac:chgData name="Micha Engeser" userId="a533b431-da3e-471f-8983-fd723c6850d4" providerId="ADAL" clId="{05E83482-96C4-4B03-864C-FE5F129C6CDA}" dt="2023-12-01T12:58:01.639" v="3375" actId="22"/>
+          <ac:picMkLst>
+            <pc:docMk/>
+            <pc:sldMk cId="2961459844" sldId="285"/>
+            <ac:picMk id="3" creationId="{3228FD5D-5924-9876-43E6-734822CE9281}"/>
+          </ac:picMkLst>
+        </pc:picChg>
       </pc:sldChg>
       <pc:sldChg chg="modSp add del mod">
         <pc:chgData name="Micha Engeser" userId="a533b431-da3e-471f-8983-fd723c6850d4" providerId="ADAL" clId="{05E83482-96C4-4B03-864C-FE5F129C6CDA}" dt="2023-11-24T15:40:16.591" v="2815" actId="47"/>
@@ -1071,13 +1111,13 @@
         </pc:spChg>
       </pc:sldChg>
       <pc:sldChg chg="modSp add mod ord">
-        <pc:chgData name="Micha Engeser" userId="a533b431-da3e-471f-8983-fd723c6850d4" providerId="ADAL" clId="{05E83482-96C4-4B03-864C-FE5F129C6CDA}" dt="2023-11-27T15:57:07.581" v="3278" actId="20577"/>
+        <pc:chgData name="Micha Engeser" userId="a533b431-da3e-471f-8983-fd723c6850d4" providerId="ADAL" clId="{05E83482-96C4-4B03-864C-FE5F129C6CDA}" dt="2023-12-01T10:53:51.140" v="3367" actId="20577"/>
         <pc:sldMkLst>
           <pc:docMk/>
           <pc:sldMk cId="3028571398" sldId="287"/>
         </pc:sldMkLst>
         <pc:spChg chg="mod">
-          <ac:chgData name="Micha Engeser" userId="a533b431-da3e-471f-8983-fd723c6850d4" providerId="ADAL" clId="{05E83482-96C4-4B03-864C-FE5F129C6CDA}" dt="2023-11-27T15:57:03.018" v="3271" actId="20577"/>
+          <ac:chgData name="Micha Engeser" userId="a533b431-da3e-471f-8983-fd723c6850d4" providerId="ADAL" clId="{05E83482-96C4-4B03-864C-FE5F129C6CDA}" dt="2023-12-01T10:53:51.140" v="3367" actId="20577"/>
           <ac:spMkLst>
             <pc:docMk/>
             <pc:sldMk cId="3028571398" sldId="287"/>
@@ -1330,7 +1370,7 @@
           <a:p>
             <a:fld id="{9D7C6ACB-8DF6-1449-BE97-CA8D947F79D3}" type="datetimeFigureOut">
               <a:rPr lang="en-US" smtClean="0"/>
-              <a:t>11/28/2023</a:t>
+              <a:t>12/1/2023</a:t>
             </a:fld>
             <a:endParaRPr lang="en-US"/>
           </a:p>
@@ -1498,7 +1538,7 @@
           <a:p>
             <a:fld id="{9D7C6ACB-8DF6-1449-BE97-CA8D947F79D3}" type="datetimeFigureOut">
               <a:rPr lang="en-US" smtClean="0"/>
-              <a:t>11/28/2023</a:t>
+              <a:t>12/1/2023</a:t>
             </a:fld>
             <a:endParaRPr lang="en-US"/>
           </a:p>
@@ -1676,7 +1716,7 @@
           <a:p>
             <a:fld id="{9D7C6ACB-8DF6-1449-BE97-CA8D947F79D3}" type="datetimeFigureOut">
               <a:rPr lang="en-US" smtClean="0"/>
-              <a:t>11/28/2023</a:t>
+              <a:t>12/1/2023</a:t>
             </a:fld>
             <a:endParaRPr lang="en-US"/>
           </a:p>
@@ -1844,7 +1884,7 @@
           <a:p>
             <a:fld id="{9D7C6ACB-8DF6-1449-BE97-CA8D947F79D3}" type="datetimeFigureOut">
               <a:rPr lang="en-US" smtClean="0"/>
-              <a:t>11/28/2023</a:t>
+              <a:t>12/1/2023</a:t>
             </a:fld>
             <a:endParaRPr lang="en-US"/>
           </a:p>
@@ -2089,7 +2129,7 @@
           <a:p>
             <a:fld id="{9D7C6ACB-8DF6-1449-BE97-CA8D947F79D3}" type="datetimeFigureOut">
               <a:rPr lang="en-US" smtClean="0"/>
-              <a:t>11/28/2023</a:t>
+              <a:t>12/1/2023</a:t>
             </a:fld>
             <a:endParaRPr lang="en-US"/>
           </a:p>
@@ -2374,7 +2414,7 @@
           <a:p>
             <a:fld id="{9D7C6ACB-8DF6-1449-BE97-CA8D947F79D3}" type="datetimeFigureOut">
               <a:rPr lang="en-US" smtClean="0"/>
-              <a:t>11/28/2023</a:t>
+              <a:t>12/1/2023</a:t>
             </a:fld>
             <a:endParaRPr lang="en-US"/>
           </a:p>
@@ -2793,7 +2833,7 @@
           <a:p>
             <a:fld id="{9D7C6ACB-8DF6-1449-BE97-CA8D947F79D3}" type="datetimeFigureOut">
               <a:rPr lang="en-US" smtClean="0"/>
-              <a:t>11/28/2023</a:t>
+              <a:t>12/1/2023</a:t>
             </a:fld>
             <a:endParaRPr lang="en-US"/>
           </a:p>
@@ -2910,7 +2950,7 @@
           <a:p>
             <a:fld id="{9D7C6ACB-8DF6-1449-BE97-CA8D947F79D3}" type="datetimeFigureOut">
               <a:rPr lang="en-US" smtClean="0"/>
-              <a:t>11/28/2023</a:t>
+              <a:t>12/1/2023</a:t>
             </a:fld>
             <a:endParaRPr lang="en-US"/>
           </a:p>
@@ -3005,7 +3045,7 @@
           <a:p>
             <a:fld id="{9D7C6ACB-8DF6-1449-BE97-CA8D947F79D3}" type="datetimeFigureOut">
               <a:rPr lang="en-US" smtClean="0"/>
-              <a:t>11/28/2023</a:t>
+              <a:t>12/1/2023</a:t>
             </a:fld>
             <a:endParaRPr lang="en-US"/>
           </a:p>
@@ -3280,7 +3320,7 @@
           <a:p>
             <a:fld id="{9D7C6ACB-8DF6-1449-BE97-CA8D947F79D3}" type="datetimeFigureOut">
               <a:rPr lang="en-US" smtClean="0"/>
-              <a:t>11/28/2023</a:t>
+              <a:t>12/1/2023</a:t>
             </a:fld>
             <a:endParaRPr lang="en-US"/>
           </a:p>
@@ -3532,7 +3572,7 @@
           <a:p>
             <a:fld id="{9D7C6ACB-8DF6-1449-BE97-CA8D947F79D3}" type="datetimeFigureOut">
               <a:rPr lang="en-US" smtClean="0"/>
-              <a:t>11/28/2023</a:t>
+              <a:t>12/1/2023</a:t>
             </a:fld>
             <a:endParaRPr lang="en-US"/>
           </a:p>
@@ -3746,7 +3786,7 @@
           <a:p>
             <a:fld id="{9D7C6ACB-8DF6-1449-BE97-CA8D947F79D3}" type="datetimeFigureOut">
               <a:rPr lang="en-US" smtClean="0"/>
-              <a:t>11/28/2023</a:t>
+              <a:t>12/1/2023</a:t>
             </a:fld>
             <a:endParaRPr lang="en-US"/>
           </a:p>
@@ -4388,7 +4428,7 @@
           <a:p>
             <a:r>
               <a:rPr lang="en-US" sz="2400" dirty="0"/>
-              <a:t>Please provide your personal judgment on the complexity in the appearance of the presented scene.</a:t>
+              <a:t>Please provide your personal judgment on the complexity in the appearance of the presented scene. You think of complexity as the number of elements appearing in a scene.</a:t>
             </a:r>
           </a:p>
           <a:p>
@@ -4439,10 +4479,6 @@
               <a:rPr lang="en-US" sz="2400" dirty="0"/>
               <a:t>Take your time. No speed pressure in this task. </a:t>
             </a:r>
-          </a:p>
-          <a:p>
-            <a:pPr algn="ctr"/>
-            <a:endParaRPr lang="en-US" sz="2400" dirty="0"/>
           </a:p>
           <a:p>
             <a:pPr algn="ctr"/>
@@ -6715,6 +6751,36 @@
           </a:p>
         </p:txBody>
       </p:sp>
+      <p:pic>
+        <p:nvPicPr>
+          <p:cNvPr id="8" name="Picture 7">
+            <a:extLst>
+              <a:ext uri="{FF2B5EF4-FFF2-40B4-BE49-F238E27FC236}">
+                <a16:creationId xmlns:a16="http://schemas.microsoft.com/office/drawing/2014/main" id="{F9D93483-E00C-4B3D-0016-4FAE33DDA13F}"/>
+              </a:ext>
+            </a:extLst>
+          </p:cNvPr>
+          <p:cNvPicPr>
+            <a:picLocks noChangeAspect="1"/>
+          </p:cNvPicPr>
+          <p:nvPr/>
+        </p:nvPicPr>
+        <p:blipFill>
+          <a:blip r:embed="rId3"/>
+          <a:stretch>
+            <a:fillRect/>
+          </a:stretch>
+        </p:blipFill>
+        <p:spPr>
+          <a:xfrm>
+            <a:off x="2976127" y="366285"/>
+            <a:ext cx="6239746" cy="6125430"/>
+          </a:xfrm>
+          <a:prstGeom prst="rect">
+            <a:avLst/>
+          </a:prstGeom>
+        </p:spPr>
+      </p:pic>
     </p:spTree>
     <p:extLst>
       <p:ext uri="{BB962C8B-B14F-4D97-AF65-F5344CB8AC3E}">
@@ -7303,6 +7369,36 @@
           </a:p>
         </p:txBody>
       </p:sp>
+      <p:pic>
+        <p:nvPicPr>
+          <p:cNvPr id="3" name="Picture 2">
+            <a:extLst>
+              <a:ext uri="{FF2B5EF4-FFF2-40B4-BE49-F238E27FC236}">
+                <a16:creationId xmlns:a16="http://schemas.microsoft.com/office/drawing/2014/main" id="{511E7084-13DD-261A-40E7-8908B1FD66A5}"/>
+              </a:ext>
+            </a:extLst>
+          </p:cNvPr>
+          <p:cNvPicPr>
+            <a:picLocks noChangeAspect="1"/>
+          </p:cNvPicPr>
+          <p:nvPr/>
+        </p:nvPicPr>
+        <p:blipFill>
+          <a:blip r:embed="rId3"/>
+          <a:stretch>
+            <a:fillRect/>
+          </a:stretch>
+        </p:blipFill>
+        <p:spPr>
+          <a:xfrm>
+            <a:off x="619497" y="4840560"/>
+            <a:ext cx="1762371" cy="619211"/>
+          </a:xfrm>
+          <a:prstGeom prst="rect">
+            <a:avLst/>
+          </a:prstGeom>
+        </p:spPr>
+      </p:pic>
     </p:spTree>
     <p:extLst>
       <p:ext uri="{BB962C8B-B14F-4D97-AF65-F5344CB8AC3E}">
@@ -7376,7 +7472,7 @@
           <a:p>
             <a:r>
               <a:rPr lang="en-US" sz="2400" dirty="0"/>
-              <a:t> </a:t>
+              <a:t>  beauty</a:t>
             </a:r>
           </a:p>
           <a:p>
@@ -7874,6 +7970,36 @@
           </a:p>
         </p:txBody>
       </p:sp>
+      <p:pic>
+        <p:nvPicPr>
+          <p:cNvPr id="3" name="Picture 2">
+            <a:extLst>
+              <a:ext uri="{FF2B5EF4-FFF2-40B4-BE49-F238E27FC236}">
+                <a16:creationId xmlns:a16="http://schemas.microsoft.com/office/drawing/2014/main" id="{58AC10CD-296A-6EE6-69A2-16B8EB978E39}"/>
+              </a:ext>
+            </a:extLst>
+          </p:cNvPr>
+          <p:cNvPicPr>
+            <a:picLocks noChangeAspect="1"/>
+          </p:cNvPicPr>
+          <p:nvPr/>
+        </p:nvPicPr>
+        <p:blipFill>
+          <a:blip r:embed="rId3"/>
+          <a:stretch>
+            <a:fillRect/>
+          </a:stretch>
+        </p:blipFill>
+        <p:spPr>
+          <a:xfrm>
+            <a:off x="595643" y="3235892"/>
+            <a:ext cx="1943371" cy="819264"/>
+          </a:xfrm>
+          <a:prstGeom prst="rect">
+            <a:avLst/>
+          </a:prstGeom>
+        </p:spPr>
+      </p:pic>
     </p:spTree>
     <p:extLst>
       <p:ext uri="{BB962C8B-B14F-4D97-AF65-F5344CB8AC3E}">
@@ -8533,6 +8659,36 @@
           </a:p>
         </p:txBody>
       </p:sp>
+      <p:pic>
+        <p:nvPicPr>
+          <p:cNvPr id="3" name="Picture 2">
+            <a:extLst>
+              <a:ext uri="{FF2B5EF4-FFF2-40B4-BE49-F238E27FC236}">
+                <a16:creationId xmlns:a16="http://schemas.microsoft.com/office/drawing/2014/main" id="{3228FD5D-5924-9876-43E6-734822CE9281}"/>
+              </a:ext>
+            </a:extLst>
+          </p:cNvPr>
+          <p:cNvPicPr>
+            <a:picLocks noChangeAspect="1"/>
+          </p:cNvPicPr>
+          <p:nvPr/>
+        </p:nvPicPr>
+        <p:blipFill>
+          <a:blip r:embed="rId3"/>
+          <a:stretch>
+            <a:fillRect/>
+          </a:stretch>
+        </p:blipFill>
+        <p:spPr>
+          <a:xfrm>
+            <a:off x="5291025" y="2971736"/>
+            <a:ext cx="1609950" cy="914528"/>
+          </a:xfrm>
+          <a:prstGeom prst="rect">
+            <a:avLst/>
+          </a:prstGeom>
+        </p:spPr>
+      </p:pic>
     </p:spTree>
     <p:extLst>
       <p:ext uri="{BB962C8B-B14F-4D97-AF65-F5344CB8AC3E}">

</xml_diff>